<commit_message>
changes to Capstone 2 report
</commit_message>
<xml_diff>
--- a/Capstone Project 2/Capstone 2 Slides.pptx
+++ b/Capstone Project 2/Capstone 2 Slides.pptx
@@ -131,7 +131,7 @@
 <file path=ppt/revisionInfo.xml><?xml version="1.0" encoding="utf-8"?>
 <p1510:revInfo xmlns:a="http://schemas.openxmlformats.org/drawingml/2006/main" xmlns:r="http://schemas.openxmlformats.org/officeDocument/2006/relationships" xmlns:p1510="http://schemas.microsoft.com/office/powerpoint/2015/10/main">
   <p1510:revLst>
-    <p1510:client id="{20CAB1E2-2128-4A0A-B64B-A8F2B1EFB254}" v="140" dt="2020-05-06T03:02:50.244"/>
+    <p1510:client id="{20CAB1E2-2128-4A0A-B64B-A8F2B1EFB254}" v="145" dt="2020-05-08T05:11:46.459"/>
   </p1510:revLst>
 </p1510:revInfo>
 </file>
@@ -141,7 +141,7 @@
   <pc:docChgLst>
     <pc:chgData name="Anna Kantur" userId="5d98c94bdddc4bd3" providerId="LiveId" clId="{20CAB1E2-2128-4A0A-B64B-A8F2B1EFB254}"/>
     <pc:docChg chg="undo custSel mod addSld modSld sldOrd">
-      <pc:chgData name="Anna Kantur" userId="5d98c94bdddc4bd3" providerId="LiveId" clId="{20CAB1E2-2128-4A0A-B64B-A8F2B1EFB254}" dt="2020-05-06T03:03:04.964" v="2668" actId="1076"/>
+      <pc:chgData name="Anna Kantur" userId="5d98c94bdddc4bd3" providerId="LiveId" clId="{20CAB1E2-2128-4A0A-B64B-A8F2B1EFB254}" dt="2020-05-08T05:13:07.592" v="2758" actId="20577"/>
       <pc:docMkLst>
         <pc:docMk/>
       </pc:docMkLst>
@@ -176,7 +176,7 @@
         </pc:spChg>
       </pc:sldChg>
       <pc:sldChg chg="addSp delSp modSp add mod">
-        <pc:chgData name="Anna Kantur" userId="5d98c94bdddc4bd3" providerId="LiveId" clId="{20CAB1E2-2128-4A0A-B64B-A8F2B1EFB254}" dt="2020-05-03T22:43:37.950" v="433" actId="1076"/>
+        <pc:chgData name="Anna Kantur" userId="5d98c94bdddc4bd3" providerId="LiveId" clId="{20CAB1E2-2128-4A0A-B64B-A8F2B1EFB254}" dt="2020-05-08T05:09:38.411" v="2673" actId="1076"/>
         <pc:sldMkLst>
           <pc:docMk/>
           <pc:sldMk cId="133032678" sldId="259"/>
@@ -198,7 +198,15 @@
           </ac:spMkLst>
         </pc:spChg>
         <pc:picChg chg="add mod">
-          <ac:chgData name="Anna Kantur" userId="5d98c94bdddc4bd3" providerId="LiveId" clId="{20CAB1E2-2128-4A0A-B64B-A8F2B1EFB254}" dt="2020-05-03T22:43:37.950" v="433" actId="1076"/>
+          <ac:chgData name="Anna Kantur" userId="5d98c94bdddc4bd3" providerId="LiveId" clId="{20CAB1E2-2128-4A0A-B64B-A8F2B1EFB254}" dt="2020-05-08T05:09:38.411" v="2673" actId="1076"/>
+          <ac:picMkLst>
+            <pc:docMk/>
+            <pc:sldMk cId="133032678" sldId="259"/>
+            <ac:picMk id="5" creationId="{96A26745-5A49-4C90-AECD-7EA40034333D}"/>
+          </ac:picMkLst>
+        </pc:picChg>
+        <pc:picChg chg="add del mod">
+          <ac:chgData name="Anna Kantur" userId="5d98c94bdddc4bd3" providerId="LiveId" clId="{20CAB1E2-2128-4A0A-B64B-A8F2B1EFB254}" dt="2020-05-08T05:09:16.674" v="2669" actId="478"/>
           <ac:picMkLst>
             <pc:docMk/>
             <pc:sldMk cId="133032678" sldId="259"/>
@@ -285,7 +293,7 @@
         </pc:picChg>
       </pc:sldChg>
       <pc:sldChg chg="addSp delSp modSp add mod ord setBg">
-        <pc:chgData name="Anna Kantur" userId="5d98c94bdddc4bd3" providerId="LiveId" clId="{20CAB1E2-2128-4A0A-B64B-A8F2B1EFB254}" dt="2020-05-03T23:02:57.427" v="809"/>
+        <pc:chgData name="Anna Kantur" userId="5d98c94bdddc4bd3" providerId="LiveId" clId="{20CAB1E2-2128-4A0A-B64B-A8F2B1EFB254}" dt="2020-05-08T05:10:19.791" v="2680" actId="1076"/>
         <pc:sldMkLst>
           <pc:docMk/>
           <pc:sldMk cId="736150546" sldId="262"/>
@@ -386,6 +394,14 @@
             <ac:picMk id="5" creationId="{A719FA54-1379-407E-A43D-68B14599B953}"/>
           </ac:picMkLst>
         </pc:picChg>
+        <pc:picChg chg="add mod">
+          <ac:chgData name="Anna Kantur" userId="5d98c94bdddc4bd3" providerId="LiveId" clId="{20CAB1E2-2128-4A0A-B64B-A8F2B1EFB254}" dt="2020-05-08T05:10:19.791" v="2680" actId="1076"/>
+          <ac:picMkLst>
+            <pc:docMk/>
+            <pc:sldMk cId="736150546" sldId="262"/>
+            <ac:picMk id="5" creationId="{F09E078C-D7A7-4D64-9069-9CC0E49851CA}"/>
+          </ac:picMkLst>
+        </pc:picChg>
         <pc:picChg chg="del mod">
           <ac:chgData name="Anna Kantur" userId="5d98c94bdddc4bd3" providerId="LiveId" clId="{20CAB1E2-2128-4A0A-B64B-A8F2B1EFB254}" dt="2020-05-03T22:52:19.530" v="639" actId="478"/>
           <ac:picMkLst>
@@ -402,8 +418,8 @@
             <ac:picMk id="2050" creationId="{946658C4-8B02-4D3B-B7FA-1E39578192FA}"/>
           </ac:picMkLst>
         </pc:picChg>
-        <pc:picChg chg="add mod">
-          <ac:chgData name="Anna Kantur" userId="5d98c94bdddc4bd3" providerId="LiveId" clId="{20CAB1E2-2128-4A0A-B64B-A8F2B1EFB254}" dt="2020-05-03T23:01:32.507" v="806" actId="14100"/>
+        <pc:picChg chg="add del mod">
+          <ac:chgData name="Anna Kantur" userId="5d98c94bdddc4bd3" providerId="LiveId" clId="{20CAB1E2-2128-4A0A-B64B-A8F2B1EFB254}" dt="2020-05-08T05:09:49.980" v="2674" actId="478"/>
           <ac:picMkLst>
             <pc:docMk/>
             <pc:sldMk cId="736150546" sldId="262"/>
@@ -412,13 +428,13 @@
         </pc:picChg>
       </pc:sldChg>
       <pc:sldChg chg="addSp delSp modSp add mod">
-        <pc:chgData name="Anna Kantur" userId="5d98c94bdddc4bd3" providerId="LiveId" clId="{20CAB1E2-2128-4A0A-B64B-A8F2B1EFB254}" dt="2020-05-03T23:04:48.114" v="896" actId="14100"/>
+        <pc:chgData name="Anna Kantur" userId="5d98c94bdddc4bd3" providerId="LiveId" clId="{20CAB1E2-2128-4A0A-B64B-A8F2B1EFB254}" dt="2020-05-08T05:10:55.839" v="2694" actId="1076"/>
         <pc:sldMkLst>
           <pc:docMk/>
           <pc:sldMk cId="544284299" sldId="263"/>
         </pc:sldMkLst>
         <pc:spChg chg="mod">
-          <ac:chgData name="Anna Kantur" userId="5d98c94bdddc4bd3" providerId="LiveId" clId="{20CAB1E2-2128-4A0A-B64B-A8F2B1EFB254}" dt="2020-05-03T23:04:48.114" v="896" actId="14100"/>
+          <ac:chgData name="Anna Kantur" userId="5d98c94bdddc4bd3" providerId="LiveId" clId="{20CAB1E2-2128-4A0A-B64B-A8F2B1EFB254}" dt="2020-05-08T05:10:35.075" v="2689" actId="20577"/>
           <ac:spMkLst>
             <pc:docMk/>
             <pc:sldMk cId="544284299" sldId="263"/>
@@ -441,6 +457,14 @@
             <ac:picMk id="5" creationId="{A719FA54-1379-407E-A43D-68B14599B953}"/>
           </ac:picMkLst>
         </pc:picChg>
+        <pc:picChg chg="add mod">
+          <ac:chgData name="Anna Kantur" userId="5d98c94bdddc4bd3" providerId="LiveId" clId="{20CAB1E2-2128-4A0A-B64B-A8F2B1EFB254}" dt="2020-05-08T05:10:55.839" v="2694" actId="1076"/>
+          <ac:picMkLst>
+            <pc:docMk/>
+            <pc:sldMk cId="544284299" sldId="263"/>
+            <ac:picMk id="5" creationId="{C5E1521D-5D0E-4A25-AEFA-4A4587364711}"/>
+          </ac:picMkLst>
+        </pc:picChg>
         <pc:picChg chg="del">
           <ac:chgData name="Anna Kantur" userId="5d98c94bdddc4bd3" providerId="LiveId" clId="{20CAB1E2-2128-4A0A-B64B-A8F2B1EFB254}" dt="2020-05-03T23:03:13.497" v="844" actId="478"/>
           <ac:picMkLst>
@@ -449,8 +473,8 @@
             <ac:picMk id="7" creationId="{964B3748-F3EC-4698-A61D-4C3E4E602FDE}"/>
           </ac:picMkLst>
         </pc:picChg>
-        <pc:picChg chg="add mod">
-          <ac:chgData name="Anna Kantur" userId="5d98c94bdddc4bd3" providerId="LiveId" clId="{20CAB1E2-2128-4A0A-B64B-A8F2B1EFB254}" dt="2020-05-03T23:03:58.980" v="853" actId="1076"/>
+        <pc:picChg chg="add del mod">
+          <ac:chgData name="Anna Kantur" userId="5d98c94bdddc4bd3" providerId="LiveId" clId="{20CAB1E2-2128-4A0A-B64B-A8F2B1EFB254}" dt="2020-05-08T05:10:23.720" v="2681" actId="478"/>
           <ac:picMkLst>
             <pc:docMk/>
             <pc:sldMk cId="544284299" sldId="263"/>
@@ -561,7 +585,7 @@
         </pc:picChg>
       </pc:sldChg>
       <pc:sldChg chg="addSp delSp modSp add mod">
-        <pc:chgData name="Anna Kantur" userId="5d98c94bdddc4bd3" providerId="LiveId" clId="{20CAB1E2-2128-4A0A-B64B-A8F2B1EFB254}" dt="2020-05-03T23:18:46.336" v="1393" actId="14100"/>
+        <pc:chgData name="Anna Kantur" userId="5d98c94bdddc4bd3" providerId="LiveId" clId="{20CAB1E2-2128-4A0A-B64B-A8F2B1EFB254}" dt="2020-05-08T05:11:55.853" v="2755" actId="14100"/>
         <pc:sldMkLst>
           <pc:docMk/>
           <pc:sldMk cId="446478720" sldId="266"/>
@@ -575,7 +599,7 @@
           </ac:spMkLst>
         </pc:spChg>
         <pc:spChg chg="add mod">
-          <ac:chgData name="Anna Kantur" userId="5d98c94bdddc4bd3" providerId="LiveId" clId="{20CAB1E2-2128-4A0A-B64B-A8F2B1EFB254}" dt="2020-05-03T23:18:46.336" v="1393" actId="14100"/>
+          <ac:chgData name="Anna Kantur" userId="5d98c94bdddc4bd3" providerId="LiveId" clId="{20CAB1E2-2128-4A0A-B64B-A8F2B1EFB254}" dt="2020-05-08T05:11:55.853" v="2755" actId="14100"/>
           <ac:spMkLst>
             <pc:docMk/>
             <pc:sldMk cId="446478720" sldId="266"/>
@@ -631,7 +655,7 @@
         </pc:picChg>
       </pc:sldChg>
       <pc:sldChg chg="addSp delSp modSp add mod">
-        <pc:chgData name="Anna Kantur" userId="5d98c94bdddc4bd3" providerId="LiveId" clId="{20CAB1E2-2128-4A0A-B64B-A8F2B1EFB254}" dt="2020-05-03T23:31:38.029" v="2054" actId="5793"/>
+        <pc:chgData name="Anna Kantur" userId="5d98c94bdddc4bd3" providerId="LiveId" clId="{20CAB1E2-2128-4A0A-B64B-A8F2B1EFB254}" dt="2020-05-08T05:13:07.592" v="2758" actId="20577"/>
         <pc:sldMkLst>
           <pc:docMk/>
           <pc:sldMk cId="1599417119" sldId="268"/>
@@ -645,7 +669,7 @@
           </ac:spMkLst>
         </pc:spChg>
         <pc:spChg chg="mod">
-          <ac:chgData name="Anna Kantur" userId="5d98c94bdddc4bd3" providerId="LiveId" clId="{20CAB1E2-2128-4A0A-B64B-A8F2B1EFB254}" dt="2020-05-03T23:31:38.029" v="2054" actId="5793"/>
+          <ac:chgData name="Anna Kantur" userId="5d98c94bdddc4bd3" providerId="LiveId" clId="{20CAB1E2-2128-4A0A-B64B-A8F2B1EFB254}" dt="2020-05-08T05:13:07.592" v="2758" actId="20577"/>
           <ac:spMkLst>
             <pc:docMk/>
             <pc:sldMk cId="1599417119" sldId="268"/>
@@ -961,7 +985,7 @@
           <a:p>
             <a:fld id="{82EDB8D0-98ED-4B86-9D5F-E61ADC70144D}" type="datetimeFigureOut">
               <a:rPr lang="en-US" smtClean="0"/>
-              <a:t>5/5/2020</a:t>
+              <a:t>5/7/2020</a:t>
             </a:fld>
             <a:endParaRPr lang="en-US" dirty="0"/>
           </a:p>
@@ -1376,7 +1400,7 @@
           <a:p>
             <a:fld id="{82EDB8D0-98ED-4B86-9D5F-E61ADC70144D}" type="datetimeFigureOut">
               <a:rPr lang="en-US" smtClean="0"/>
-              <a:t>5/5/2020</a:t>
+              <a:t>5/7/2020</a:t>
             </a:fld>
             <a:endParaRPr lang="en-US"/>
           </a:p>
@@ -1868,7 +1892,7 @@
           <a:p>
             <a:fld id="{82EDB8D0-98ED-4B86-9D5F-E61ADC70144D}" type="datetimeFigureOut">
               <a:rPr lang="en-US" smtClean="0"/>
-              <a:t>5/5/2020</a:t>
+              <a:t>5/7/2020</a:t>
             </a:fld>
             <a:endParaRPr lang="en-US"/>
           </a:p>
@@ -2355,7 +2379,7 @@
           <a:p>
             <a:fld id="{82EDB8D0-98ED-4B86-9D5F-E61ADC70144D}" type="datetimeFigureOut">
               <a:rPr lang="en-US" smtClean="0"/>
-              <a:t>5/5/2020</a:t>
+              <a:t>5/7/2020</a:t>
             </a:fld>
             <a:endParaRPr lang="en-US" dirty="0"/>
           </a:p>
@@ -3124,7 +3148,7 @@
           <a:p>
             <a:fld id="{82EDB8D0-98ED-4B86-9D5F-E61ADC70144D}" type="datetimeFigureOut">
               <a:rPr lang="en-US" smtClean="0"/>
-              <a:t>5/5/2020</a:t>
+              <a:t>5/7/2020</a:t>
             </a:fld>
             <a:endParaRPr lang="en-US"/>
           </a:p>
@@ -3606,7 +3630,7 @@
           <a:p>
             <a:fld id="{82EDB8D0-98ED-4B86-9D5F-E61ADC70144D}" type="datetimeFigureOut">
               <a:rPr lang="en-US" smtClean="0"/>
-              <a:t>5/5/2020</a:t>
+              <a:t>5/7/2020</a:t>
             </a:fld>
             <a:endParaRPr lang="en-US"/>
           </a:p>
@@ -4302,7 +4326,7 @@
           <a:p>
             <a:fld id="{82EDB8D0-98ED-4B86-9D5F-E61ADC70144D}" type="datetimeFigureOut">
               <a:rPr lang="en-US" smtClean="0"/>
-              <a:t>5/5/2020</a:t>
+              <a:t>5/7/2020</a:t>
             </a:fld>
             <a:endParaRPr lang="en-US"/>
           </a:p>
@@ -4727,7 +4751,7 @@
           <a:p>
             <a:fld id="{82EDB8D0-98ED-4B86-9D5F-E61ADC70144D}" type="datetimeFigureOut">
               <a:rPr lang="en-US" smtClean="0"/>
-              <a:t>5/5/2020</a:t>
+              <a:t>5/7/2020</a:t>
             </a:fld>
             <a:endParaRPr lang="en-US"/>
           </a:p>
@@ -5124,7 +5148,7 @@
           <a:p>
             <a:fld id="{82EDB8D0-98ED-4B86-9D5F-E61ADC70144D}" type="datetimeFigureOut">
               <a:rPr lang="en-US" smtClean="0"/>
-              <a:t>5/5/2020</a:t>
+              <a:t>5/7/2020</a:t>
             </a:fld>
             <a:endParaRPr lang="en-US"/>
           </a:p>
@@ -5719,7 +5743,7 @@
           <a:p>
             <a:fld id="{82EDB8D0-98ED-4B86-9D5F-E61ADC70144D}" type="datetimeFigureOut">
               <a:rPr lang="en-US" smtClean="0"/>
-              <a:t>5/5/2020</a:t>
+              <a:t>5/7/2020</a:t>
             </a:fld>
             <a:endParaRPr lang="en-US"/>
           </a:p>
@@ -6294,7 +6318,7 @@
           <a:p>
             <a:fld id="{82EDB8D0-98ED-4B86-9D5F-E61ADC70144D}" type="datetimeFigureOut">
               <a:rPr lang="en-US" smtClean="0"/>
-              <a:t>5/5/2020</a:t>
+              <a:t>5/7/2020</a:t>
             </a:fld>
             <a:endParaRPr lang="en-US"/>
           </a:p>
@@ -6821,7 +6845,7 @@
             <a:fld id="{82EDB8D0-98ED-4B86-9D5F-E61ADC70144D}" type="datetimeFigureOut">
               <a:rPr lang="en-US" smtClean="0"/>
               <a:pPr/>
-              <a:t>5/5/2020</a:t>
+              <a:t>5/7/2020</a:t>
             </a:fld>
             <a:endParaRPr lang="en-US" dirty="0"/>
           </a:p>
@@ -9843,8 +9867,8 @@
         </p:nvSpPr>
         <p:spPr>
           <a:xfrm>
-            <a:off x="262270" y="1230398"/>
-            <a:ext cx="7499497" cy="4616072"/>
+            <a:off x="482009" y="1230398"/>
+            <a:ext cx="7279758" cy="4616072"/>
           </a:xfrm>
           <a:prstGeom prst="rect">
             <a:avLst/>
@@ -9919,7 +9943,7 @@
             </a:pPr>
             <a:r>
               <a:rPr lang="en-US" dirty="0"/>
-              <a:t>Between 2019 and 2020 there was a 5-6% YoY increase in disease-related tweets in both groups, which equals to 4K more tweets in 2020 in every user cohort</a:t>
+              <a:t>Between 2019 and 2020 there was a 500% YoY increase in disease-related tweets for “active” users and only 100% YoY increase for “lazy” users</a:t>
             </a:r>
             <a:endParaRPr lang="en-CA" dirty="0"/>
           </a:p>
@@ -10325,7 +10349,7 @@
             </a:pPr>
             <a:r>
               <a:rPr lang="en-US" dirty="0"/>
-              <a:t>Even the most highly rated words had negative values, so they are not highly predictive</a:t>
+              <a:t>Even the most highly rated words had negative values, so they were not highly predictive</a:t>
             </a:r>
             <a:endParaRPr lang="en-CA" dirty="0"/>
           </a:p>
@@ -11622,10 +11646,10 @@
       </p:pic>
       <p:pic>
         <p:nvPicPr>
-          <p:cNvPr id="6" name="Picture 5" descr="A picture containing screenshot&#10;&#10;Description automatically generated">
-            <a:extLst>
-              <a:ext uri="{FF2B5EF4-FFF2-40B4-BE49-F238E27FC236}">
-                <a16:creationId xmlns:a16="http://schemas.microsoft.com/office/drawing/2014/main" id="{91331747-0272-45DF-A6CA-DD53A9DACEB3}"/>
+          <p:cNvPr id="5" name="Picture 4" descr="A close up of a card&#10;&#10;Description automatically generated">
+            <a:extLst>
+              <a:ext uri="{FF2B5EF4-FFF2-40B4-BE49-F238E27FC236}">
+                <a16:creationId xmlns:a16="http://schemas.microsoft.com/office/drawing/2014/main" id="{96A26745-5A49-4C90-AECD-7EA40034333D}"/>
               </a:ext>
             </a:extLst>
           </p:cNvPr>
@@ -11648,8 +11672,8 @@
         </p:blipFill>
         <p:spPr>
           <a:xfrm>
-            <a:off x="2578617" y="1566333"/>
-            <a:ext cx="5849458" cy="5199518"/>
+            <a:off x="1260688" y="1673141"/>
+            <a:ext cx="9146084" cy="4573042"/>
           </a:xfrm>
           <a:prstGeom prst="rect">
             <a:avLst/>
@@ -12176,15 +12200,15 @@
       </p:sp>
       <p:pic>
         <p:nvPicPr>
-          <p:cNvPr id="2052" name="Picture 4">
-            <a:extLst>
-              <a:ext uri="{FF2B5EF4-FFF2-40B4-BE49-F238E27FC236}">
-                <a16:creationId xmlns:a16="http://schemas.microsoft.com/office/drawing/2014/main" id="{F78AABC9-F70D-4D30-8CC3-88CC0AC369AC}"/>
+          <p:cNvPr id="5" name="Picture 4" descr="A screenshot of a cell phone&#10;&#10;Description automatically generated">
+            <a:extLst>
+              <a:ext uri="{FF2B5EF4-FFF2-40B4-BE49-F238E27FC236}">
+                <a16:creationId xmlns:a16="http://schemas.microsoft.com/office/drawing/2014/main" id="{F09E078C-D7A7-4D64-9069-9CC0E49851CA}"/>
               </a:ext>
             </a:extLst>
           </p:cNvPr>
           <p:cNvPicPr>
-            <a:picLocks noChangeAspect="1" noChangeArrowheads="1"/>
+            <a:picLocks noChangeAspect="1"/>
           </p:cNvPicPr>
           <p:nvPr/>
         </p:nvPicPr>
@@ -12196,34 +12220,18 @@
               </a:ext>
             </a:extLst>
           </a:blip>
-          <a:srcRect/>
           <a:stretch>
             <a:fillRect/>
           </a:stretch>
         </p:blipFill>
-        <p:spPr bwMode="auto">
+        <p:spPr>
           <a:xfrm>
-            <a:off x="5706140" y="1027906"/>
-            <a:ext cx="5854995" cy="5039833"/>
+            <a:off x="5801901" y="301432"/>
+            <a:ext cx="5867400" cy="5867400"/>
           </a:xfrm>
           <a:prstGeom prst="rect">
             <a:avLst/>
           </a:prstGeom>
-          <a:noFill/>
-          <a:ln>
-            <a:solidFill>
-              <a:schemeClr val="tx1"/>
-            </a:solidFill>
-          </a:ln>
-          <a:extLst>
-            <a:ext uri="{909E8E84-426E-40DD-AFC4-6F175D3DCCD1}">
-              <a14:hiddenFill xmlns:a14="http://schemas.microsoft.com/office/drawing/2010/main">
-                <a:solidFill>
-                  <a:srgbClr val="FFFFFF"/>
-                </a:solidFill>
-              </a14:hiddenFill>
-            </a:ext>
-          </a:extLst>
         </p:spPr>
       </p:pic>
     </p:spTree>
@@ -12279,14 +12287,16 @@
           </a:xfrm>
         </p:spPr>
         <p:txBody>
-          <a:bodyPr/>
+          <a:bodyPr>
+            <a:normAutofit fontScale="90000"/>
+          </a:bodyPr>
           <a:lstStyle/>
           <a:p>
             <a:r>
               <a:rPr lang="en-CA" b="1" dirty="0">
                 <a:hlinkClick r:id="rId2"/>
               </a:rPr>
-              <a:t>COVID Theme Shows in Most Popular Words</a:t>
+              <a:t>COVID Topic Shows Up in Most Popular Words</a:t>
             </a:r>
             <a:endParaRPr lang="en-CA" dirty="0"/>
           </a:p>
@@ -12328,15 +12338,15 @@
       </p:pic>
       <p:pic>
         <p:nvPicPr>
-          <p:cNvPr id="4098" name="Picture 2">
-            <a:extLst>
-              <a:ext uri="{FF2B5EF4-FFF2-40B4-BE49-F238E27FC236}">
-                <a16:creationId xmlns:a16="http://schemas.microsoft.com/office/drawing/2014/main" id="{A97A6E62-515B-4E51-8FFF-F26CBEDC4A88}"/>
+          <p:cNvPr id="5" name="Picture 4" descr="A picture containing comb, object&#10;&#10;Description automatically generated">
+            <a:extLst>
+              <a:ext uri="{FF2B5EF4-FFF2-40B4-BE49-F238E27FC236}">
+                <a16:creationId xmlns:a16="http://schemas.microsoft.com/office/drawing/2014/main" id="{C5E1521D-5D0E-4A25-AEFA-4A4587364711}"/>
               </a:ext>
             </a:extLst>
           </p:cNvPr>
           <p:cNvPicPr>
-            <a:picLocks noChangeAspect="1" noChangeArrowheads="1"/>
+            <a:picLocks noChangeAspect="1"/>
           </p:cNvPicPr>
           <p:nvPr/>
         </p:nvPicPr>
@@ -12348,25 +12358,18 @@
               </a:ext>
             </a:extLst>
           </a:blip>
-          <a:srcRect/>
           <a:stretch>
             <a:fillRect/>
           </a:stretch>
         </p:blipFill>
-        <p:spPr bwMode="auto">
+        <p:spPr>
           <a:xfrm>
-            <a:off x="2961167" y="1345018"/>
-            <a:ext cx="5332228" cy="5332228"/>
+            <a:off x="2744972" y="1330842"/>
+            <a:ext cx="5527158" cy="5527158"/>
           </a:xfrm>
           <a:prstGeom prst="rect">
             <a:avLst/>
           </a:prstGeom>
-          <a:noFill/>
-          <a:ln>
-            <a:solidFill>
-              <a:schemeClr val="tx1"/>
-            </a:solidFill>
-          </a:ln>
         </p:spPr>
       </p:pic>
     </p:spTree>

</xml_diff>